<commit_message>
add eagle related works
</commit_message>
<xml_diff>
--- a/Research/Paper/Eagle/Figures.pptx
+++ b/Research/Paper/Eagle/Figures.pptx
@@ -3464,7 +3464,14 @@
             <a:pPr algn="ctr"/>
             <a:r>
               <a:rPr kumimoji="1" lang="en-US" altLang="zh-CN" dirty="0" smtClean="0"/>
-              <a:t>Privacy Related</a:t>
+              <a:t>Privacy</a:t>
+            </a:r>
+          </a:p>
+          <a:p>
+            <a:pPr algn="ctr"/>
+            <a:r>
+              <a:rPr kumimoji="1" lang="en-US" altLang="zh-CN" dirty="0" smtClean="0"/>
+              <a:t>Sensitive</a:t>
             </a:r>
             <a:endParaRPr kumimoji="1" lang="zh-CN" altLang="en-US" dirty="0"/>
           </a:p>

</xml_diff>

<commit_message>
update Eagle related work
</commit_message>
<xml_diff>
--- a/Research/Paper/Eagle/Figures.pptx
+++ b/Research/Paper/Eagle/Figures.pptx
@@ -5,8 +5,9 @@
     <p:sldMasterId id="2147483648" r:id="rId1"/>
   </p:sldMasterIdLst>
   <p:sldIdLst>
-    <p:sldId id="256" r:id="rId2"/>
-    <p:sldId id="257" r:id="rId3"/>
+    <p:sldId id="257" r:id="rId2"/>
+    <p:sldId id="258" r:id="rId3"/>
+    <p:sldId id="259" r:id="rId4"/>
   </p:sldIdLst>
   <p:sldSz cx="12192000" cy="6858000"/>
   <p:notesSz cx="6858000" cy="9144000"/>
@@ -244,7 +245,7 @@
           <a:p>
             <a:fld id="{E2C93D97-6191-7341-ADFD-05A2C5957D94}" type="datetimeFigureOut">
               <a:rPr kumimoji="1" lang="zh-CN" altLang="en-US" smtClean="0"/>
-              <a:t>2017/11/28</a:t>
+              <a:t>2017/12/4</a:t>
             </a:fld>
             <a:endParaRPr kumimoji="1" lang="zh-CN" altLang="en-US"/>
           </a:p>
@@ -414,7 +415,7 @@
           <a:p>
             <a:fld id="{E2C93D97-6191-7341-ADFD-05A2C5957D94}" type="datetimeFigureOut">
               <a:rPr kumimoji="1" lang="zh-CN" altLang="en-US" smtClean="0"/>
-              <a:t>2017/11/28</a:t>
+              <a:t>2017/12/4</a:t>
             </a:fld>
             <a:endParaRPr kumimoji="1" lang="zh-CN" altLang="en-US"/>
           </a:p>
@@ -594,7 +595,7 @@
           <a:p>
             <a:fld id="{E2C93D97-6191-7341-ADFD-05A2C5957D94}" type="datetimeFigureOut">
               <a:rPr kumimoji="1" lang="zh-CN" altLang="en-US" smtClean="0"/>
-              <a:t>2017/11/28</a:t>
+              <a:t>2017/12/4</a:t>
             </a:fld>
             <a:endParaRPr kumimoji="1" lang="zh-CN" altLang="en-US"/>
           </a:p>
@@ -764,7 +765,7 @@
           <a:p>
             <a:fld id="{E2C93D97-6191-7341-ADFD-05A2C5957D94}" type="datetimeFigureOut">
               <a:rPr kumimoji="1" lang="zh-CN" altLang="en-US" smtClean="0"/>
-              <a:t>2017/11/28</a:t>
+              <a:t>2017/12/4</a:t>
             </a:fld>
             <a:endParaRPr kumimoji="1" lang="zh-CN" altLang="en-US"/>
           </a:p>
@@ -1010,7 +1011,7 @@
           <a:p>
             <a:fld id="{E2C93D97-6191-7341-ADFD-05A2C5957D94}" type="datetimeFigureOut">
               <a:rPr kumimoji="1" lang="zh-CN" altLang="en-US" smtClean="0"/>
-              <a:t>2017/11/28</a:t>
+              <a:t>2017/12/4</a:t>
             </a:fld>
             <a:endParaRPr kumimoji="1" lang="zh-CN" altLang="en-US"/>
           </a:p>
@@ -1242,7 +1243,7 @@
           <a:p>
             <a:fld id="{E2C93D97-6191-7341-ADFD-05A2C5957D94}" type="datetimeFigureOut">
               <a:rPr kumimoji="1" lang="zh-CN" altLang="en-US" smtClean="0"/>
-              <a:t>2017/11/28</a:t>
+              <a:t>2017/12/4</a:t>
             </a:fld>
             <a:endParaRPr kumimoji="1" lang="zh-CN" altLang="en-US"/>
           </a:p>
@@ -1609,7 +1610,7 @@
           <a:p>
             <a:fld id="{E2C93D97-6191-7341-ADFD-05A2C5957D94}" type="datetimeFigureOut">
               <a:rPr kumimoji="1" lang="zh-CN" altLang="en-US" smtClean="0"/>
-              <a:t>2017/11/28</a:t>
+              <a:t>2017/12/4</a:t>
             </a:fld>
             <a:endParaRPr kumimoji="1" lang="zh-CN" altLang="en-US"/>
           </a:p>
@@ -1727,7 +1728,7 @@
           <a:p>
             <a:fld id="{E2C93D97-6191-7341-ADFD-05A2C5957D94}" type="datetimeFigureOut">
               <a:rPr kumimoji="1" lang="zh-CN" altLang="en-US" smtClean="0"/>
-              <a:t>2017/11/28</a:t>
+              <a:t>2017/12/4</a:t>
             </a:fld>
             <a:endParaRPr kumimoji="1" lang="zh-CN" altLang="en-US"/>
           </a:p>
@@ -1822,7 +1823,7 @@
           <a:p>
             <a:fld id="{E2C93D97-6191-7341-ADFD-05A2C5957D94}" type="datetimeFigureOut">
               <a:rPr kumimoji="1" lang="zh-CN" altLang="en-US" smtClean="0"/>
-              <a:t>2017/11/28</a:t>
+              <a:t>2017/12/4</a:t>
             </a:fld>
             <a:endParaRPr kumimoji="1" lang="zh-CN" altLang="en-US"/>
           </a:p>
@@ -2099,7 +2100,7 @@
           <a:p>
             <a:fld id="{E2C93D97-6191-7341-ADFD-05A2C5957D94}" type="datetimeFigureOut">
               <a:rPr kumimoji="1" lang="zh-CN" altLang="en-US" smtClean="0"/>
-              <a:t>2017/11/28</a:t>
+              <a:t>2017/12/4</a:t>
             </a:fld>
             <a:endParaRPr kumimoji="1" lang="zh-CN" altLang="en-US"/>
           </a:p>
@@ -2352,7 +2353,7 @@
           <a:p>
             <a:fld id="{E2C93D97-6191-7341-ADFD-05A2C5957D94}" type="datetimeFigureOut">
               <a:rPr kumimoji="1" lang="zh-CN" altLang="en-US" smtClean="0"/>
-              <a:t>2017/11/28</a:t>
+              <a:t>2017/12/4</a:t>
             </a:fld>
             <a:endParaRPr kumimoji="1" lang="zh-CN" altLang="en-US"/>
           </a:p>
@@ -2565,7 +2566,7 @@
           <a:p>
             <a:fld id="{E2C93D97-6191-7341-ADFD-05A2C5957D94}" type="datetimeFigureOut">
               <a:rPr kumimoji="1" lang="zh-CN" altLang="en-US" smtClean="0"/>
-              <a:t>2017/11/28</a:t>
+              <a:t>2017/12/4</a:t>
             </a:fld>
             <a:endParaRPr kumimoji="1" lang="zh-CN" altLang="en-US"/>
           </a:p>
@@ -2972,27 +2973,468 @@
       </p:grpSpPr>
       <p:sp>
         <p:nvSpPr>
-          <p:cNvPr id="3" name="副标题 2"/>
-          <p:cNvSpPr>
-            <a:spLocks noGrp="1"/>
-          </p:cNvSpPr>
-          <p:nvPr>
-            <p:ph type="subTitle" idx="1"/>
-          </p:nvPr>
-        </p:nvSpPr>
-        <p:spPr/>
-        <p:txBody>
-          <a:bodyPr/>
-          <a:lstStyle/>
-          <a:p>
-            <a:endParaRPr kumimoji="1" lang="zh-CN" altLang="en-US"/>
-          </a:p>
-        </p:txBody>
-      </p:sp>
+          <p:cNvPr id="17" name="椭圆 16"/>
+          <p:cNvSpPr/>
+          <p:nvPr/>
+        </p:nvSpPr>
+        <p:spPr>
+          <a:xfrm>
+            <a:off x="4281063" y="214816"/>
+            <a:ext cx="2074459" cy="1187355"/>
+          </a:xfrm>
+          <a:prstGeom prst="ellipse">
+            <a:avLst/>
+          </a:prstGeom>
+        </p:spPr>
+        <p:style>
+          <a:lnRef idx="2">
+            <a:schemeClr val="accent1"/>
+          </a:lnRef>
+          <a:fillRef idx="1">
+            <a:schemeClr val="lt1"/>
+          </a:fillRef>
+          <a:effectRef idx="0">
+            <a:schemeClr val="accent1"/>
+          </a:effectRef>
+          <a:fontRef idx="minor">
+            <a:schemeClr val="dk1"/>
+          </a:fontRef>
+        </p:style>
+        <p:txBody>
+          <a:bodyPr rtlCol="0" anchor="ctr"/>
+          <a:lstStyle/>
+          <a:p>
+            <a:pPr algn="ctr"/>
+            <a:r>
+              <a:rPr kumimoji="1" lang="en-US" altLang="zh-CN" dirty="0" smtClean="0"/>
+              <a:t>General </a:t>
+            </a:r>
+            <a:r>
+              <a:rPr kumimoji="1" lang="en-US" altLang="zh-CN" dirty="0" err="1" smtClean="0"/>
+              <a:t>IoT</a:t>
+            </a:r>
+            <a:r>
+              <a:rPr kumimoji="1" lang="en-US" altLang="zh-CN" dirty="0" smtClean="0"/>
+              <a:t> System</a:t>
+            </a:r>
+            <a:endParaRPr kumimoji="1" lang="zh-CN" altLang="en-US" dirty="0"/>
+          </a:p>
+        </p:txBody>
+      </p:sp>
+      <p:sp>
+        <p:nvSpPr>
+          <p:cNvPr id="18" name="椭圆 17"/>
+          <p:cNvSpPr/>
+          <p:nvPr/>
+        </p:nvSpPr>
+        <p:spPr>
+          <a:xfrm>
+            <a:off x="366430" y="1834696"/>
+            <a:ext cx="2074459" cy="1187355"/>
+          </a:xfrm>
+          <a:prstGeom prst="ellipse">
+            <a:avLst/>
+          </a:prstGeom>
+        </p:spPr>
+        <p:style>
+          <a:lnRef idx="2">
+            <a:schemeClr val="accent1"/>
+          </a:lnRef>
+          <a:fillRef idx="1">
+            <a:schemeClr val="lt1"/>
+          </a:fillRef>
+          <a:effectRef idx="0">
+            <a:schemeClr val="accent1"/>
+          </a:effectRef>
+          <a:fontRef idx="minor">
+            <a:schemeClr val="dk1"/>
+          </a:fontRef>
+        </p:style>
+        <p:txBody>
+          <a:bodyPr rtlCol="0" anchor="ctr"/>
+          <a:lstStyle/>
+          <a:p>
+            <a:pPr algn="ctr"/>
+            <a:r>
+              <a:rPr kumimoji="1" lang="en-US" altLang="zh-CN" dirty="0" smtClean="0"/>
+              <a:t>Smart Home Oriented </a:t>
+            </a:r>
+            <a:r>
+              <a:rPr kumimoji="1" lang="en-US" altLang="zh-CN" dirty="0" err="1" smtClean="0"/>
+              <a:t>IoT</a:t>
+            </a:r>
+            <a:endParaRPr kumimoji="1" lang="zh-CN" altLang="en-US" dirty="0"/>
+          </a:p>
+        </p:txBody>
+      </p:sp>
+      <p:sp>
+        <p:nvSpPr>
+          <p:cNvPr id="19" name="椭圆 18"/>
+          <p:cNvSpPr/>
+          <p:nvPr/>
+        </p:nvSpPr>
+        <p:spPr>
+          <a:xfrm>
+            <a:off x="2861696" y="1834695"/>
+            <a:ext cx="2074459" cy="1187355"/>
+          </a:xfrm>
+          <a:prstGeom prst="ellipse">
+            <a:avLst/>
+          </a:prstGeom>
+        </p:spPr>
+        <p:style>
+          <a:lnRef idx="2">
+            <a:schemeClr val="accent1"/>
+          </a:lnRef>
+          <a:fillRef idx="1">
+            <a:schemeClr val="lt1"/>
+          </a:fillRef>
+          <a:effectRef idx="0">
+            <a:schemeClr val="accent1"/>
+          </a:effectRef>
+          <a:fontRef idx="minor">
+            <a:schemeClr val="dk1"/>
+          </a:fontRef>
+        </p:style>
+        <p:txBody>
+          <a:bodyPr rtlCol="0" anchor="ctr"/>
+          <a:lstStyle/>
+          <a:p>
+            <a:pPr algn="ctr"/>
+            <a:r>
+              <a:rPr kumimoji="1" lang="en-US" altLang="zh-CN" dirty="0" smtClean="0"/>
+              <a:t>Industry Oriented </a:t>
+            </a:r>
+            <a:r>
+              <a:rPr kumimoji="1" lang="en-US" altLang="zh-CN" dirty="0" err="1" smtClean="0"/>
+              <a:t>IoT</a:t>
+            </a:r>
+            <a:endParaRPr kumimoji="1" lang="zh-CN" altLang="en-US" dirty="0"/>
+          </a:p>
+        </p:txBody>
+      </p:sp>
+      <p:sp>
+        <p:nvSpPr>
+          <p:cNvPr id="20" name="椭圆 19"/>
+          <p:cNvSpPr/>
+          <p:nvPr/>
+        </p:nvSpPr>
+        <p:spPr>
+          <a:xfrm>
+            <a:off x="8020547" y="1834693"/>
+            <a:ext cx="2074459" cy="1187355"/>
+          </a:xfrm>
+          <a:prstGeom prst="ellipse">
+            <a:avLst/>
+          </a:prstGeom>
+        </p:spPr>
+        <p:style>
+          <a:lnRef idx="2">
+            <a:schemeClr val="accent1"/>
+          </a:lnRef>
+          <a:fillRef idx="1">
+            <a:schemeClr val="lt1"/>
+          </a:fillRef>
+          <a:effectRef idx="0">
+            <a:schemeClr val="accent1"/>
+          </a:effectRef>
+          <a:fontRef idx="minor">
+            <a:schemeClr val="dk1"/>
+          </a:fontRef>
+        </p:style>
+        <p:txBody>
+          <a:bodyPr rtlCol="0" anchor="ctr"/>
+          <a:lstStyle/>
+          <a:p>
+            <a:pPr algn="ctr"/>
+            <a:r>
+              <a:rPr kumimoji="1" lang="en-US" altLang="zh-CN" dirty="0" smtClean="0"/>
+              <a:t>Food Delivery Oriented </a:t>
+            </a:r>
+            <a:r>
+              <a:rPr kumimoji="1" lang="en-US" altLang="zh-CN" dirty="0" err="1" smtClean="0"/>
+              <a:t>IoT</a:t>
+            </a:r>
+            <a:endParaRPr kumimoji="1" lang="zh-CN" altLang="en-US" dirty="0"/>
+          </a:p>
+        </p:txBody>
+      </p:sp>
+      <p:sp>
+        <p:nvSpPr>
+          <p:cNvPr id="22" name="椭圆 21"/>
+          <p:cNvSpPr/>
+          <p:nvPr/>
+        </p:nvSpPr>
+        <p:spPr>
+          <a:xfrm>
+            <a:off x="5441121" y="1834693"/>
+            <a:ext cx="2074459" cy="1187355"/>
+          </a:xfrm>
+          <a:prstGeom prst="ellipse">
+            <a:avLst/>
+          </a:prstGeom>
+        </p:spPr>
+        <p:style>
+          <a:lnRef idx="2">
+            <a:schemeClr val="accent1"/>
+          </a:lnRef>
+          <a:fillRef idx="1">
+            <a:schemeClr val="lt1"/>
+          </a:fillRef>
+          <a:effectRef idx="0">
+            <a:schemeClr val="accent1"/>
+          </a:effectRef>
+          <a:fontRef idx="minor">
+            <a:schemeClr val="dk1"/>
+          </a:fontRef>
+        </p:style>
+        <p:txBody>
+          <a:bodyPr rtlCol="0" anchor="ctr"/>
+          <a:lstStyle/>
+          <a:p>
+            <a:pPr algn="ctr"/>
+            <a:r>
+              <a:rPr kumimoji="1" lang="en-US" altLang="zh-CN" dirty="0" smtClean="0"/>
+              <a:t>Other </a:t>
+            </a:r>
+            <a:r>
+              <a:rPr kumimoji="1" lang="en-US" altLang="zh-CN" dirty="0" err="1" smtClean="0"/>
+              <a:t>IoT</a:t>
+            </a:r>
+            <a:r>
+              <a:rPr kumimoji="1" lang="en-US" altLang="zh-CN" dirty="0" smtClean="0"/>
+              <a:t> System</a:t>
+            </a:r>
+            <a:endParaRPr kumimoji="1" lang="zh-CN" altLang="en-US" dirty="0"/>
+          </a:p>
+        </p:txBody>
+      </p:sp>
+      <p:cxnSp>
+        <p:nvCxnSpPr>
+          <p:cNvPr id="23" name="直线箭头连接符 22"/>
+          <p:cNvCxnSpPr>
+            <a:stCxn id="17" idx="2"/>
+            <a:endCxn id="18" idx="0"/>
+          </p:cNvCxnSpPr>
+          <p:nvPr/>
+        </p:nvCxnSpPr>
+        <p:spPr>
+          <a:xfrm flipH="1">
+            <a:off x="1403660" y="808494"/>
+            <a:ext cx="2877403" cy="1026202"/>
+          </a:xfrm>
+          <a:prstGeom prst="straightConnector1">
+            <a:avLst/>
+          </a:prstGeom>
+          <a:ln>
+            <a:tailEnd type="triangle"/>
+          </a:ln>
+        </p:spPr>
+        <p:style>
+          <a:lnRef idx="1">
+            <a:schemeClr val="accent1"/>
+          </a:lnRef>
+          <a:fillRef idx="0">
+            <a:schemeClr val="accent1"/>
+          </a:fillRef>
+          <a:effectRef idx="0">
+            <a:schemeClr val="accent1"/>
+          </a:effectRef>
+          <a:fontRef idx="minor">
+            <a:schemeClr val="tx1"/>
+          </a:fontRef>
+        </p:style>
+      </p:cxnSp>
+      <p:cxnSp>
+        <p:nvCxnSpPr>
+          <p:cNvPr id="25" name="直线箭头连接符 24"/>
+          <p:cNvCxnSpPr>
+            <a:stCxn id="17" idx="3"/>
+            <a:endCxn id="19" idx="0"/>
+          </p:cNvCxnSpPr>
+          <p:nvPr/>
+        </p:nvCxnSpPr>
+        <p:spPr>
+          <a:xfrm flipH="1">
+            <a:off x="3898926" y="1228287"/>
+            <a:ext cx="685934" cy="606408"/>
+          </a:xfrm>
+          <a:prstGeom prst="straightConnector1">
+            <a:avLst/>
+          </a:prstGeom>
+          <a:ln>
+            <a:tailEnd type="triangle"/>
+          </a:ln>
+        </p:spPr>
+        <p:style>
+          <a:lnRef idx="1">
+            <a:schemeClr val="accent1"/>
+          </a:lnRef>
+          <a:fillRef idx="0">
+            <a:schemeClr val="accent1"/>
+          </a:fillRef>
+          <a:effectRef idx="0">
+            <a:schemeClr val="accent1"/>
+          </a:effectRef>
+          <a:fontRef idx="minor">
+            <a:schemeClr val="tx1"/>
+          </a:fontRef>
+        </p:style>
+      </p:cxnSp>
+      <p:cxnSp>
+        <p:nvCxnSpPr>
+          <p:cNvPr id="28" name="直线箭头连接符 27"/>
+          <p:cNvCxnSpPr>
+            <a:stCxn id="17" idx="5"/>
+            <a:endCxn id="22" idx="0"/>
+          </p:cNvCxnSpPr>
+          <p:nvPr/>
+        </p:nvCxnSpPr>
+        <p:spPr>
+          <a:xfrm>
+            <a:off x="6051725" y="1228287"/>
+            <a:ext cx="426626" cy="606406"/>
+          </a:xfrm>
+          <a:prstGeom prst="straightConnector1">
+            <a:avLst/>
+          </a:prstGeom>
+          <a:ln>
+            <a:tailEnd type="triangle"/>
+          </a:ln>
+        </p:spPr>
+        <p:style>
+          <a:lnRef idx="1">
+            <a:schemeClr val="accent1"/>
+          </a:lnRef>
+          <a:fillRef idx="0">
+            <a:schemeClr val="accent1"/>
+          </a:fillRef>
+          <a:effectRef idx="0">
+            <a:schemeClr val="accent1"/>
+          </a:effectRef>
+          <a:fontRef idx="minor">
+            <a:schemeClr val="tx1"/>
+          </a:fontRef>
+        </p:style>
+      </p:cxnSp>
+      <p:cxnSp>
+        <p:nvCxnSpPr>
+          <p:cNvPr id="32" name="直线箭头连接符 31"/>
+          <p:cNvCxnSpPr>
+            <a:stCxn id="17" idx="6"/>
+            <a:endCxn id="20" idx="0"/>
+          </p:cNvCxnSpPr>
+          <p:nvPr/>
+        </p:nvCxnSpPr>
+        <p:spPr>
+          <a:xfrm>
+            <a:off x="6355522" y="808494"/>
+            <a:ext cx="2702255" cy="1026199"/>
+          </a:xfrm>
+          <a:prstGeom prst="straightConnector1">
+            <a:avLst/>
+          </a:prstGeom>
+          <a:ln>
+            <a:tailEnd type="triangle"/>
+          </a:ln>
+        </p:spPr>
+        <p:style>
+          <a:lnRef idx="1">
+            <a:schemeClr val="accent1"/>
+          </a:lnRef>
+          <a:fillRef idx="0">
+            <a:schemeClr val="accent1"/>
+          </a:fillRef>
+          <a:effectRef idx="0">
+            <a:schemeClr val="accent1"/>
+          </a:effectRef>
+          <a:fontRef idx="minor">
+            <a:schemeClr val="tx1"/>
+          </a:fontRef>
+        </p:style>
+      </p:cxnSp>
+      <p:sp>
+        <p:nvSpPr>
+          <p:cNvPr id="34" name="椭圆 33"/>
+          <p:cNvSpPr/>
+          <p:nvPr/>
+        </p:nvSpPr>
+        <p:spPr>
+          <a:xfrm>
+            <a:off x="8477534" y="3662345"/>
+            <a:ext cx="1498978" cy="771804"/>
+          </a:xfrm>
+          <a:prstGeom prst="ellipse">
+            <a:avLst/>
+          </a:prstGeom>
+        </p:spPr>
+        <p:style>
+          <a:lnRef idx="2">
+            <a:schemeClr val="accent1"/>
+          </a:lnRef>
+          <a:fillRef idx="1">
+            <a:schemeClr val="lt1"/>
+          </a:fillRef>
+          <a:effectRef idx="0">
+            <a:schemeClr val="accent1"/>
+          </a:effectRef>
+          <a:fontRef idx="minor">
+            <a:schemeClr val="dk1"/>
+          </a:fontRef>
+        </p:style>
+        <p:txBody>
+          <a:bodyPr rtlCol="0" anchor="ctr"/>
+          <a:lstStyle/>
+          <a:p>
+            <a:pPr algn="ctr"/>
+            <a:r>
+              <a:rPr kumimoji="1" lang="en-US" altLang="zh-CN" b="1" dirty="0" smtClean="0"/>
+              <a:t>Eagle</a:t>
+            </a:r>
+            <a:endParaRPr kumimoji="1" lang="zh-CN" altLang="en-US" b="1" dirty="0"/>
+          </a:p>
+        </p:txBody>
+      </p:sp>
+      <p:cxnSp>
+        <p:nvCxnSpPr>
+          <p:cNvPr id="35" name="直线箭头连接符 34"/>
+          <p:cNvCxnSpPr>
+            <a:stCxn id="20" idx="4"/>
+            <a:endCxn id="34" idx="0"/>
+          </p:cNvCxnSpPr>
+          <p:nvPr/>
+        </p:nvCxnSpPr>
+        <p:spPr>
+          <a:xfrm>
+            <a:off x="9057777" y="3022048"/>
+            <a:ext cx="169246" cy="640297"/>
+          </a:xfrm>
+          <a:prstGeom prst="straightConnector1">
+            <a:avLst/>
+          </a:prstGeom>
+          <a:ln>
+            <a:tailEnd type="triangle"/>
+          </a:ln>
+        </p:spPr>
+        <p:style>
+          <a:lnRef idx="1">
+            <a:schemeClr val="accent1"/>
+          </a:lnRef>
+          <a:fillRef idx="0">
+            <a:schemeClr val="accent1"/>
+          </a:fillRef>
+          <a:effectRef idx="0">
+            <a:schemeClr val="accent1"/>
+          </a:effectRef>
+          <a:fontRef idx="minor">
+            <a:schemeClr val="tx1"/>
+          </a:fontRef>
+        </p:style>
+      </p:cxnSp>
     </p:spTree>
     <p:extLst>
       <p:ext uri="{BB962C8B-B14F-4D97-AF65-F5344CB8AC3E}">
-        <p14:creationId xmlns:p14="http://schemas.microsoft.com/office/powerpoint/2010/main" val="76914611"/>
+        <p14:creationId xmlns:p14="http://schemas.microsoft.com/office/powerpoint/2010/main" val="1525112947"/>
       </p:ext>
     </p:extLst>
   </p:cSld>
@@ -3027,7 +3469,7 @@
         </p:nvSpPr>
         <p:spPr>
           <a:xfrm>
-            <a:off x="2629431" y="294133"/>
+            <a:off x="2221017" y="633693"/>
             <a:ext cx="2074459" cy="1187355"/>
           </a:xfrm>
           <a:prstGeom prst="ellipse">
@@ -3063,105 +3505,13 @@
       </p:sp>
       <p:sp>
         <p:nvSpPr>
-          <p:cNvPr id="3" name="文本框 2"/>
-          <p:cNvSpPr txBox="1"/>
-          <p:nvPr/>
-        </p:nvSpPr>
-        <p:spPr>
-          <a:xfrm>
-            <a:off x="7820166" y="436728"/>
-            <a:ext cx="4011855" cy="2585323"/>
-          </a:xfrm>
-          <a:prstGeom prst="rect">
-            <a:avLst/>
-          </a:prstGeom>
-          <a:noFill/>
-        </p:spPr>
-        <p:txBody>
-          <a:bodyPr wrap="square" rtlCol="0">
-            <a:spAutoFit/>
-          </a:bodyPr>
-          <a:lstStyle/>
-          <a:p>
-            <a:r>
-              <a:rPr kumimoji="1" lang="en-US" altLang="zh-CN" dirty="0" smtClean="0"/>
-              <a:t>Design </a:t>
-            </a:r>
-            <a:r>
-              <a:rPr kumimoji="1" lang="en-US" altLang="zh-CN" dirty="0" smtClean="0"/>
-              <a:t>Space</a:t>
-            </a:r>
-          </a:p>
-          <a:p>
-            <a:endParaRPr kumimoji="1" lang="en-US" altLang="zh-CN" dirty="0"/>
-          </a:p>
-          <a:p>
-            <a:r>
-              <a:rPr kumimoji="1" lang="en-US" altLang="zh-CN" dirty="0" smtClean="0"/>
-              <a:t>Challenges of Large Scale System:</a:t>
-            </a:r>
-          </a:p>
-          <a:p>
-            <a:pPr marL="342900" indent="-342900">
-              <a:buAutoNum type="arabicPeriod"/>
-            </a:pPr>
-            <a:r>
-              <a:rPr kumimoji="1" lang="en-US" altLang="zh-CN" dirty="0" smtClean="0"/>
-              <a:t>Need deployment strategy.</a:t>
-            </a:r>
-            <a:endParaRPr kumimoji="1" lang="en-US" altLang="zh-CN" dirty="0"/>
-          </a:p>
-          <a:p>
-            <a:pPr marL="342900" indent="-342900">
-              <a:buAutoNum type="arabicPeriod"/>
-            </a:pPr>
-            <a:r>
-              <a:rPr kumimoji="1" lang="en-US" altLang="zh-CN" dirty="0" smtClean="0"/>
-              <a:t>Data fusing</a:t>
-            </a:r>
-          </a:p>
-          <a:p>
-            <a:pPr marL="342900" indent="-342900">
-              <a:buAutoNum type="arabicPeriod"/>
-            </a:pPr>
-            <a:endParaRPr kumimoji="1" lang="en-US" altLang="zh-CN" dirty="0"/>
-          </a:p>
-          <a:p>
-            <a:r>
-              <a:rPr kumimoji="1" lang="en-US" altLang="zh-CN" dirty="0" smtClean="0"/>
-              <a:t>Challenges of Privacy Related System:</a:t>
-            </a:r>
-          </a:p>
-          <a:p>
-            <a:pPr marL="342900" indent="-342900">
-              <a:buAutoNum type="arabicPeriod"/>
-            </a:pPr>
-            <a:r>
-              <a:rPr kumimoji="1" lang="en-US" altLang="zh-CN" dirty="0" smtClean="0"/>
-              <a:t>Data privacy</a:t>
-            </a:r>
-          </a:p>
-          <a:p>
-            <a:pPr marL="342900" indent="-342900">
-              <a:buAutoNum type="arabicPeriod"/>
-            </a:pPr>
-            <a:r>
-              <a:rPr kumimoji="1" lang="en-US" altLang="zh-CN" dirty="0" smtClean="0"/>
-              <a:t>Data security</a:t>
-            </a:r>
-            <a:endParaRPr kumimoji="1" lang="en-US" altLang="zh-CN" dirty="0"/>
-          </a:p>
-        </p:txBody>
-      </p:sp>
-      <p:sp>
-        <p:nvSpPr>
-          <p:cNvPr id="4" name="椭圆 3"/>
+          <p:cNvPr id="3" name="椭圆 2"/>
           <p:cNvSpPr/>
           <p:nvPr/>
         </p:nvSpPr>
         <p:spPr>
           <a:xfrm>
-            <a:off x="873421" y="3074073"/>
+            <a:off x="465007" y="3413633"/>
             <a:ext cx="1498978" cy="771804"/>
           </a:xfrm>
           <a:prstGeom prst="ellipse">
@@ -3197,13 +3547,13 @@
       </p:sp>
       <p:sp>
         <p:nvSpPr>
-          <p:cNvPr id="5" name="椭圆 4"/>
+          <p:cNvPr id="4" name="椭圆 3"/>
           <p:cNvSpPr/>
           <p:nvPr/>
         </p:nvSpPr>
         <p:spPr>
           <a:xfrm>
-            <a:off x="873421" y="1781738"/>
+            <a:off x="465007" y="2121298"/>
             <a:ext cx="1498978" cy="793845"/>
           </a:xfrm>
           <a:prstGeom prst="ellipse">
@@ -3239,13 +3589,13 @@
       </p:sp>
       <p:sp>
         <p:nvSpPr>
-          <p:cNvPr id="6" name="椭圆 5"/>
+          <p:cNvPr id="5" name="椭圆 4"/>
           <p:cNvSpPr/>
           <p:nvPr/>
         </p:nvSpPr>
         <p:spPr>
           <a:xfrm>
-            <a:off x="4703890" y="1781738"/>
+            <a:off x="4295476" y="2121298"/>
             <a:ext cx="1498978" cy="793846"/>
           </a:xfrm>
           <a:prstGeom prst="ellipse">
@@ -3281,7 +3631,7 @@
       </p:sp>
       <p:cxnSp>
         <p:nvCxnSpPr>
-          <p:cNvPr id="8" name="直线箭头连接符 7"/>
+          <p:cNvPr id="6" name="直线箭头连接符 5"/>
           <p:cNvCxnSpPr>
             <a:endCxn id="5" idx="0"/>
           </p:cNvCxnSpPr>
@@ -3289,8 +3639,206 @@
         </p:nvCxnSpPr>
         <p:spPr>
           <a:xfrm flipH="1">
-            <a:off x="1622910" y="1323369"/>
+            <a:off x="1214496" y="1662929"/>
             <a:ext cx="1310318" cy="458369"/>
+          </a:xfrm>
+          <a:prstGeom prst="straightConnector1">
+            <a:avLst/>
+          </a:prstGeom>
+          <a:ln>
+            <a:tailEnd type="triangle"/>
+          </a:ln>
+        </p:spPr>
+        <p:style>
+          <a:lnRef idx="1">
+            <a:schemeClr val="accent1"/>
+          </a:lnRef>
+          <a:fillRef idx="0">
+            <a:schemeClr val="accent1"/>
+          </a:fillRef>
+          <a:effectRef idx="0">
+            <a:schemeClr val="accent1"/>
+          </a:effectRef>
+          <a:fontRef idx="minor">
+            <a:schemeClr val="tx1"/>
+          </a:fontRef>
+        </p:style>
+      </p:cxnSp>
+      <p:cxnSp>
+        <p:nvCxnSpPr>
+          <p:cNvPr id="7" name="直线箭头连接符 6"/>
+          <p:cNvCxnSpPr>
+            <a:stCxn id="2" idx="5"/>
+            <a:endCxn id="6" idx="0"/>
+          </p:cNvCxnSpPr>
+          <p:nvPr/>
+        </p:nvCxnSpPr>
+        <p:spPr>
+          <a:xfrm>
+            <a:off x="3991679" y="1647164"/>
+            <a:ext cx="1053286" cy="474134"/>
+          </a:xfrm>
+          <a:prstGeom prst="straightConnector1">
+            <a:avLst/>
+          </a:prstGeom>
+          <a:ln>
+            <a:tailEnd type="triangle"/>
+          </a:ln>
+        </p:spPr>
+        <p:style>
+          <a:lnRef idx="1">
+            <a:schemeClr val="accent1"/>
+          </a:lnRef>
+          <a:fillRef idx="0">
+            <a:schemeClr val="accent1"/>
+          </a:fillRef>
+          <a:effectRef idx="0">
+            <a:schemeClr val="accent1"/>
+          </a:effectRef>
+          <a:fontRef idx="minor">
+            <a:schemeClr val="tx1"/>
+          </a:fontRef>
+        </p:style>
+      </p:cxnSp>
+      <p:cxnSp>
+        <p:nvCxnSpPr>
+          <p:cNvPr id="8" name="直线箭头连接符 7"/>
+          <p:cNvCxnSpPr>
+            <a:stCxn id="5" idx="4"/>
+            <a:endCxn id="4" idx="0"/>
+          </p:cNvCxnSpPr>
+          <p:nvPr/>
+        </p:nvCxnSpPr>
+        <p:spPr>
+          <a:xfrm>
+            <a:off x="1214496" y="2915143"/>
+            <a:ext cx="0" cy="498490"/>
+          </a:xfrm>
+          <a:prstGeom prst="straightConnector1">
+            <a:avLst/>
+          </a:prstGeom>
+          <a:ln>
+            <a:tailEnd type="triangle"/>
+          </a:ln>
+        </p:spPr>
+        <p:style>
+          <a:lnRef idx="1">
+            <a:schemeClr val="accent1"/>
+          </a:lnRef>
+          <a:fillRef idx="0">
+            <a:schemeClr val="accent1"/>
+          </a:fillRef>
+          <a:effectRef idx="0">
+            <a:schemeClr val="accent1"/>
+          </a:effectRef>
+          <a:fontRef idx="minor">
+            <a:schemeClr val="tx1"/>
+          </a:fontRef>
+        </p:style>
+      </p:cxnSp>
+      <p:sp>
+        <p:nvSpPr>
+          <p:cNvPr id="9" name="椭圆 8"/>
+          <p:cNvSpPr/>
+          <p:nvPr/>
+        </p:nvSpPr>
+        <p:spPr>
+          <a:xfrm>
+            <a:off x="5435377" y="3413633"/>
+            <a:ext cx="1498978" cy="771804"/>
+          </a:xfrm>
+          <a:prstGeom prst="ellipse">
+            <a:avLst/>
+          </a:prstGeom>
+        </p:spPr>
+        <p:style>
+          <a:lnRef idx="2">
+            <a:schemeClr val="accent1"/>
+          </a:lnRef>
+          <a:fillRef idx="1">
+            <a:schemeClr val="lt1"/>
+          </a:fillRef>
+          <a:effectRef idx="0">
+            <a:schemeClr val="accent1"/>
+          </a:effectRef>
+          <a:fontRef idx="minor">
+            <a:schemeClr val="dk1"/>
+          </a:fontRef>
+        </p:style>
+        <p:txBody>
+          <a:bodyPr rtlCol="0" anchor="ctr"/>
+          <a:lstStyle/>
+          <a:p>
+            <a:pPr algn="ctr"/>
+            <a:r>
+              <a:rPr kumimoji="1" lang="en-US" altLang="zh-CN" dirty="0" smtClean="0"/>
+              <a:t>Privacy</a:t>
+            </a:r>
+          </a:p>
+          <a:p>
+            <a:pPr algn="ctr"/>
+            <a:r>
+              <a:rPr kumimoji="1" lang="en-US" altLang="zh-CN" dirty="0" smtClean="0"/>
+              <a:t>Sensitive</a:t>
+            </a:r>
+            <a:endParaRPr kumimoji="1" lang="zh-CN" altLang="en-US" dirty="0"/>
+          </a:p>
+        </p:txBody>
+      </p:sp>
+      <p:sp>
+        <p:nvSpPr>
+          <p:cNvPr id="10" name="椭圆 9"/>
+          <p:cNvSpPr/>
+          <p:nvPr/>
+        </p:nvSpPr>
+        <p:spPr>
+          <a:xfrm>
+            <a:off x="3324936" y="3413633"/>
+            <a:ext cx="1498978" cy="771804"/>
+          </a:xfrm>
+          <a:prstGeom prst="ellipse">
+            <a:avLst/>
+          </a:prstGeom>
+        </p:spPr>
+        <p:style>
+          <a:lnRef idx="2">
+            <a:schemeClr val="accent1"/>
+          </a:lnRef>
+          <a:fillRef idx="1">
+            <a:schemeClr val="lt1"/>
+          </a:fillRef>
+          <a:effectRef idx="0">
+            <a:schemeClr val="accent1"/>
+          </a:effectRef>
+          <a:fontRef idx="minor">
+            <a:schemeClr val="dk1"/>
+          </a:fontRef>
+        </p:style>
+        <p:txBody>
+          <a:bodyPr rtlCol="0" anchor="ctr"/>
+          <a:lstStyle/>
+          <a:p>
+            <a:pPr algn="ctr"/>
+            <a:r>
+              <a:rPr kumimoji="1" lang="en-US" altLang="zh-CN" dirty="0" smtClean="0"/>
+              <a:t>Public</a:t>
+            </a:r>
+            <a:endParaRPr kumimoji="1" lang="zh-CN" altLang="en-US" dirty="0"/>
+          </a:p>
+        </p:txBody>
+      </p:sp>
+      <p:cxnSp>
+        <p:nvCxnSpPr>
+          <p:cNvPr id="11" name="直线箭头连接符 10"/>
+          <p:cNvCxnSpPr>
+            <a:stCxn id="6" idx="5"/>
+          </p:cNvCxnSpPr>
+          <p:nvPr/>
+        </p:nvCxnSpPr>
+        <p:spPr>
+          <a:xfrm>
+            <a:off x="5574934" y="2798888"/>
+            <a:ext cx="609932" cy="614745"/>
           </a:xfrm>
           <a:prstGeom prst="straightConnector1">
             <a:avLst/>
@@ -3318,15 +3866,14 @@
         <p:nvCxnSpPr>
           <p:cNvPr id="12" name="直线箭头连接符 11"/>
           <p:cNvCxnSpPr>
-            <a:stCxn id="2" idx="5"/>
-            <a:endCxn id="6" idx="0"/>
+            <a:stCxn id="6" idx="3"/>
           </p:cNvCxnSpPr>
           <p:nvPr/>
         </p:nvCxnSpPr>
         <p:spPr>
-          <a:xfrm>
-            <a:off x="4400093" y="1307604"/>
-            <a:ext cx="1053286" cy="474134"/>
+          <a:xfrm flipH="1">
+            <a:off x="4074425" y="2798888"/>
+            <a:ext cx="440571" cy="614745"/>
           </a:xfrm>
           <a:prstGeom prst="straightConnector1">
             <a:avLst/>
@@ -3352,17 +3899,16 @@
       </p:cxnSp>
       <p:cxnSp>
         <p:nvCxnSpPr>
-          <p:cNvPr id="16" name="直线箭头连接符 15"/>
+          <p:cNvPr id="13" name="直线箭头连接符 12"/>
           <p:cNvCxnSpPr>
-            <a:stCxn id="5" idx="4"/>
-            <a:endCxn id="4" idx="0"/>
+            <a:endCxn id="14" idx="0"/>
           </p:cNvCxnSpPr>
           <p:nvPr/>
         </p:nvCxnSpPr>
         <p:spPr>
           <a:xfrm>
-            <a:off x="1622910" y="2575583"/>
-            <a:ext cx="0" cy="498490"/>
+            <a:off x="6184866" y="4185437"/>
+            <a:ext cx="244366" cy="498489"/>
           </a:xfrm>
           <a:prstGeom prst="straightConnector1">
             <a:avLst/>
@@ -3388,13 +3934,13 @@
       </p:cxnSp>
       <p:sp>
         <p:nvSpPr>
-          <p:cNvPr id="21" name="椭圆 20"/>
+          <p:cNvPr id="14" name="椭圆 13"/>
           <p:cNvSpPr/>
           <p:nvPr/>
         </p:nvSpPr>
         <p:spPr>
           <a:xfrm>
-            <a:off x="6088157" y="4344366"/>
+            <a:off x="5679743" y="4683926"/>
             <a:ext cx="1498978" cy="771804"/>
           </a:xfrm>
           <a:prstGeom prst="ellipse">
@@ -3430,14 +3976,132 @@
       </p:sp>
       <p:sp>
         <p:nvSpPr>
-          <p:cNvPr id="27" name="椭圆 26"/>
+          <p:cNvPr id="16" name="文本框 15"/>
+          <p:cNvSpPr txBox="1"/>
+          <p:nvPr/>
+        </p:nvSpPr>
+        <p:spPr>
+          <a:xfrm>
+            <a:off x="7820166" y="436728"/>
+            <a:ext cx="4011855" cy="2585323"/>
+          </a:xfrm>
+          <a:prstGeom prst="rect">
+            <a:avLst/>
+          </a:prstGeom>
+          <a:noFill/>
+        </p:spPr>
+        <p:txBody>
+          <a:bodyPr wrap="square" rtlCol="0">
+            <a:spAutoFit/>
+          </a:bodyPr>
+          <a:lstStyle/>
+          <a:p>
+            <a:r>
+              <a:rPr kumimoji="1" lang="en-US" altLang="zh-CN" dirty="0" smtClean="0"/>
+              <a:t>Design Space</a:t>
+            </a:r>
+          </a:p>
+          <a:p>
+            <a:endParaRPr kumimoji="1" lang="en-US" altLang="zh-CN" dirty="0"/>
+          </a:p>
+          <a:p>
+            <a:r>
+              <a:rPr kumimoji="1" lang="en-US" altLang="zh-CN" dirty="0" smtClean="0"/>
+              <a:t>Challenges of Large Scale System:</a:t>
+            </a:r>
+          </a:p>
+          <a:p>
+            <a:pPr marL="342900" indent="-342900">
+              <a:buAutoNum type="arabicPeriod"/>
+            </a:pPr>
+            <a:r>
+              <a:rPr kumimoji="1" lang="en-US" altLang="zh-CN" dirty="0" smtClean="0"/>
+              <a:t>Need deployment strategy.</a:t>
+            </a:r>
+            <a:endParaRPr kumimoji="1" lang="en-US" altLang="zh-CN" dirty="0"/>
+          </a:p>
+          <a:p>
+            <a:pPr marL="342900" indent="-342900">
+              <a:buAutoNum type="arabicPeriod"/>
+            </a:pPr>
+            <a:r>
+              <a:rPr kumimoji="1" lang="en-US" altLang="zh-CN" dirty="0" smtClean="0"/>
+              <a:t>Data fusing</a:t>
+            </a:r>
+          </a:p>
+          <a:p>
+            <a:pPr marL="342900" indent="-342900">
+              <a:buAutoNum type="arabicPeriod"/>
+            </a:pPr>
+            <a:endParaRPr kumimoji="1" lang="en-US" altLang="zh-CN" dirty="0"/>
+          </a:p>
+          <a:p>
+            <a:r>
+              <a:rPr kumimoji="1" lang="en-US" altLang="zh-CN" dirty="0" smtClean="0"/>
+              <a:t>Challenges of Privacy Related System:</a:t>
+            </a:r>
+          </a:p>
+          <a:p>
+            <a:pPr marL="342900" indent="-342900">
+              <a:buAutoNum type="arabicPeriod"/>
+            </a:pPr>
+            <a:r>
+              <a:rPr kumimoji="1" lang="en-US" altLang="zh-CN" dirty="0" smtClean="0"/>
+              <a:t>Data privacy</a:t>
+            </a:r>
+          </a:p>
+          <a:p>
+            <a:pPr marL="342900" indent="-342900">
+              <a:buAutoNum type="arabicPeriod"/>
+            </a:pPr>
+            <a:r>
+              <a:rPr kumimoji="1" lang="en-US" altLang="zh-CN" dirty="0" smtClean="0"/>
+              <a:t>Data security</a:t>
+            </a:r>
+            <a:endParaRPr kumimoji="1" lang="en-US" altLang="zh-CN" dirty="0"/>
+          </a:p>
+        </p:txBody>
+      </p:sp>
+    </p:spTree>
+    <p:extLst>
+      <p:ext uri="{BB962C8B-B14F-4D97-AF65-F5344CB8AC3E}">
+        <p14:creationId xmlns:p14="http://schemas.microsoft.com/office/powerpoint/2010/main" val="652054797"/>
+      </p:ext>
+    </p:extLst>
+  </p:cSld>
+  <p:clrMapOvr>
+    <a:masterClrMapping/>
+  </p:clrMapOvr>
+</p:sld>
+</file>
+
+<file path=ppt/slides/slide3.xml><?xml version="1.0" encoding="utf-8"?>
+<p:sld xmlns:a="http://schemas.openxmlformats.org/drawingml/2006/main" xmlns:r="http://schemas.openxmlformats.org/officeDocument/2006/relationships" xmlns:p="http://schemas.openxmlformats.org/presentationml/2006/main">
+  <p:cSld>
+    <p:spTree>
+      <p:nvGrpSpPr>
+        <p:cNvPr id="1" name=""/>
+        <p:cNvGrpSpPr/>
+        <p:nvPr/>
+      </p:nvGrpSpPr>
+      <p:grpSpPr>
+        <a:xfrm>
+          <a:off x="0" y="0"/>
+          <a:ext cx="0" cy="0"/>
+          <a:chOff x="0" y="0"/>
+          <a:chExt cx="0" cy="0"/>
+        </a:xfrm>
+      </p:grpSpPr>
+      <p:sp>
+        <p:nvSpPr>
+          <p:cNvPr id="3" name="椭圆 2"/>
           <p:cNvSpPr/>
           <p:nvPr/>
         </p:nvSpPr>
         <p:spPr>
           <a:xfrm>
-            <a:off x="5843791" y="3074073"/>
-            <a:ext cx="1498978" cy="771804"/>
+            <a:off x="4554015" y="1534442"/>
+            <a:ext cx="2074459" cy="1187355"/>
           </a:xfrm>
           <a:prstGeom prst="ellipse">
             <a:avLst/>
@@ -3464,14 +4128,19 @@
             <a:pPr algn="ctr"/>
             <a:r>
               <a:rPr kumimoji="1" lang="en-US" altLang="zh-CN" dirty="0" smtClean="0"/>
-              <a:t>Privacy</a:t>
-            </a:r>
-          </a:p>
-          <a:p>
-            <a:pPr algn="ctr"/>
+              <a:t>iBeacon </a:t>
+            </a:r>
+            <a:r>
+              <a:rPr kumimoji="1" lang="en-US" altLang="zh-CN" dirty="0"/>
+              <a:t>b</a:t>
+            </a:r>
             <a:r>
               <a:rPr kumimoji="1" lang="en-US" altLang="zh-CN" dirty="0" smtClean="0"/>
-              <a:t>Sensitive</a:t>
+              <a:t>ased </a:t>
+            </a:r>
+            <a:r>
+              <a:rPr kumimoji="1" lang="en-US" altLang="zh-CN" dirty="0" err="1" smtClean="0"/>
+              <a:t>IoT</a:t>
             </a:r>
             <a:endParaRPr kumimoji="1" lang="zh-CN" altLang="en-US" dirty="0"/>
           </a:p>
@@ -3479,13 +4148,13 @@
       </p:sp>
       <p:sp>
         <p:nvSpPr>
-          <p:cNvPr id="29" name="椭圆 28"/>
+          <p:cNvPr id="4" name="椭圆 3"/>
           <p:cNvSpPr/>
           <p:nvPr/>
         </p:nvSpPr>
         <p:spPr>
           <a:xfrm>
-            <a:off x="3733350" y="3074073"/>
+            <a:off x="5011002" y="3362094"/>
             <a:ext cx="1498978" cy="771804"/>
           </a:xfrm>
           <a:prstGeom prst="ellipse">
@@ -3512,26 +4181,23 @@
           <a:p>
             <a:pPr algn="ctr"/>
             <a:r>
-              <a:rPr kumimoji="1" lang="en-US" altLang="zh-CN" dirty="0" smtClean="0"/>
-              <a:t>Public</a:t>
-            </a:r>
-            <a:endParaRPr kumimoji="1" lang="zh-CN" altLang="en-US" dirty="0"/>
+              <a:rPr kumimoji="1" lang="en-US" altLang="zh-CN" b="1" dirty="0" smtClean="0"/>
+              <a:t>Eagle</a:t>
+            </a:r>
+            <a:endParaRPr kumimoji="1" lang="zh-CN" altLang="en-US" b="1" dirty="0"/>
           </a:p>
         </p:txBody>
       </p:sp>
       <p:cxnSp>
         <p:nvCxnSpPr>
-          <p:cNvPr id="31" name="直线箭头连接符 30"/>
-          <p:cNvCxnSpPr>
-            <a:stCxn id="6" idx="5"/>
-            <a:endCxn id="27" idx="0"/>
-          </p:cNvCxnSpPr>
+          <p:cNvPr id="5" name="直线箭头连接符 4"/>
+          <p:cNvCxnSpPr/>
           <p:nvPr/>
         </p:nvCxnSpPr>
         <p:spPr>
           <a:xfrm>
-            <a:off x="5983348" y="2459328"/>
-            <a:ext cx="609932" cy="614745"/>
+            <a:off x="5591245" y="2721797"/>
+            <a:ext cx="169246" cy="640297"/>
           </a:xfrm>
           <a:prstGeom prst="straightConnector1">
             <a:avLst/>
@@ -3555,19 +4221,77 @@
           </a:fontRef>
         </p:style>
       </p:cxnSp>
+      <p:sp>
+        <p:nvSpPr>
+          <p:cNvPr id="6" name="椭圆 5"/>
+          <p:cNvSpPr/>
+          <p:nvPr/>
+        </p:nvSpPr>
+        <p:spPr>
+          <a:xfrm>
+            <a:off x="1596788" y="3362094"/>
+            <a:ext cx="3124093" cy="2137954"/>
+          </a:xfrm>
+          <a:prstGeom prst="ellipse">
+            <a:avLst/>
+          </a:prstGeom>
+        </p:spPr>
+        <p:style>
+          <a:lnRef idx="2">
+            <a:schemeClr val="accent1"/>
+          </a:lnRef>
+          <a:fillRef idx="1">
+            <a:schemeClr val="lt1"/>
+          </a:fillRef>
+          <a:effectRef idx="0">
+            <a:schemeClr val="accent1"/>
+          </a:effectRef>
+          <a:fontRef idx="minor">
+            <a:schemeClr val="dk1"/>
+          </a:fontRef>
+        </p:style>
+        <p:txBody>
+          <a:bodyPr rtlCol="0" anchor="ctr"/>
+          <a:lstStyle/>
+          <a:p>
+            <a:pPr algn="ctr"/>
+            <a:r>
+              <a:rPr kumimoji="1" lang="en-US" altLang="zh-CN" b="1" dirty="0"/>
+              <a:t>Raspberry Pi and </a:t>
+            </a:r>
+            <a:r>
+              <a:rPr kumimoji="1" lang="en-US" altLang="zh-CN" b="1" dirty="0" err="1"/>
+              <a:t>iBeacons</a:t>
+            </a:r>
+            <a:r>
+              <a:rPr kumimoji="1" lang="en-US" altLang="zh-CN" b="1" dirty="0"/>
+              <a:t> as </a:t>
+            </a:r>
+            <a:r>
+              <a:rPr kumimoji="1" lang="en-US" altLang="zh-CN" b="1" dirty="0" smtClean="0"/>
+              <a:t>Environmental</a:t>
+            </a:r>
+            <a:r>
+              <a:rPr kumimoji="1" lang="mr-IN" altLang="zh-CN" b="1" dirty="0" smtClean="0"/>
+              <a:t>…</a:t>
+            </a:r>
+            <a:endParaRPr kumimoji="1" lang="zh-CN" altLang="en-US" b="1" dirty="0"/>
+          </a:p>
+        </p:txBody>
+      </p:sp>
       <p:cxnSp>
         <p:nvCxnSpPr>
-          <p:cNvPr id="37" name="直线箭头连接符 36"/>
+          <p:cNvPr id="7" name="直线箭头连接符 6"/>
           <p:cNvCxnSpPr>
-            <a:stCxn id="6" idx="3"/>
-            <a:endCxn id="29" idx="0"/>
+            <a:stCxn id="3" idx="3"/>
+            <a:endCxn id="6" idx="0"/>
           </p:cNvCxnSpPr>
           <p:nvPr/>
         </p:nvCxnSpPr>
         <p:spPr>
           <a:xfrm flipH="1">
-            <a:off x="4482839" y="2459328"/>
-            <a:ext cx="440571" cy="614745"/>
+            <a:off x="3158835" y="2547913"/>
+            <a:ext cx="1698977" cy="814181"/>
           </a:xfrm>
           <a:prstGeom prst="straightConnector1">
             <a:avLst/>
@@ -3591,46 +4315,73 @@
           </a:fontRef>
         </p:style>
       </p:cxnSp>
-      <p:cxnSp>
-        <p:nvCxnSpPr>
-          <p:cNvPr id="40" name="直线箭头连接符 39"/>
-          <p:cNvCxnSpPr>
-            <a:stCxn id="27" idx="4"/>
-            <a:endCxn id="21" idx="0"/>
-          </p:cNvCxnSpPr>
+      <p:sp>
+        <p:nvSpPr>
+          <p:cNvPr id="12" name="文本框 11"/>
+          <p:cNvSpPr txBox="1"/>
           <p:nvPr/>
-        </p:nvCxnSpPr>
-        <p:spPr>
-          <a:xfrm>
-            <a:off x="6593280" y="3845877"/>
-            <a:ext cx="244366" cy="498489"/>
-          </a:xfrm>
-          <a:prstGeom prst="straightConnector1">
+        </p:nvSpPr>
+        <p:spPr>
+          <a:xfrm>
+            <a:off x="7820166" y="436728"/>
+            <a:ext cx="4011855" cy="1200329"/>
+          </a:xfrm>
+          <a:prstGeom prst="rect">
             <a:avLst/>
           </a:prstGeom>
-          <a:ln>
-            <a:tailEnd type="triangle"/>
-          </a:ln>
-        </p:spPr>
-        <p:style>
-          <a:lnRef idx="1">
-            <a:schemeClr val="accent1"/>
-          </a:lnRef>
-          <a:fillRef idx="0">
-            <a:schemeClr val="accent1"/>
-          </a:fillRef>
-          <a:effectRef idx="0">
-            <a:schemeClr val="accent1"/>
-          </a:effectRef>
-          <a:fontRef idx="minor">
-            <a:schemeClr val="tx1"/>
-          </a:fontRef>
-        </p:style>
-      </p:cxnSp>
+          <a:noFill/>
+        </p:spPr>
+        <p:txBody>
+          <a:bodyPr wrap="square" rtlCol="0">
+            <a:spAutoFit/>
+          </a:bodyPr>
+          <a:lstStyle/>
+          <a:p>
+            <a:r>
+              <a:rPr kumimoji="1" lang="en-US" altLang="zh-CN" dirty="0" smtClean="0"/>
+              <a:t>Design Space</a:t>
+            </a:r>
+          </a:p>
+          <a:p>
+            <a:endParaRPr kumimoji="1" lang="en-US" altLang="zh-CN" dirty="0" smtClean="0"/>
+          </a:p>
+          <a:p>
+            <a:r>
+              <a:rPr kumimoji="1" lang="zh-CN" altLang="en-US" dirty="0" smtClean="0"/>
+              <a:t>以 </a:t>
+            </a:r>
+            <a:r>
+              <a:rPr kumimoji="1" lang="en-US" altLang="zh-CN" dirty="0" smtClean="0"/>
+              <a:t>iBeacon</a:t>
+            </a:r>
+            <a:r>
+              <a:rPr kumimoji="1" lang="zh-CN" altLang="en-US" dirty="0" smtClean="0"/>
+              <a:t> </a:t>
+            </a:r>
+            <a:r>
+              <a:rPr kumimoji="1" lang="en-US" altLang="zh-CN" dirty="0" smtClean="0"/>
+              <a:t>based </a:t>
+            </a:r>
+            <a:r>
+              <a:rPr kumimoji="1" lang="en-US" altLang="zh-CN" dirty="0" err="1" smtClean="0"/>
+              <a:t>IoT</a:t>
+            </a:r>
+            <a:r>
+              <a:rPr kumimoji="1" lang="en-US" altLang="zh-CN" dirty="0" smtClean="0"/>
+              <a:t> </a:t>
+            </a:r>
+            <a:r>
+              <a:rPr kumimoji="1" lang="zh-CN" altLang="en-US" dirty="0" smtClean="0"/>
+              <a:t>为切入点的话就得厘清和这篇文章的不同之处</a:t>
+            </a:r>
+            <a:endParaRPr kumimoji="1" lang="en-US" altLang="zh-CN" dirty="0"/>
+          </a:p>
+        </p:txBody>
+      </p:sp>
     </p:spTree>
     <p:extLst>
       <p:ext uri="{BB962C8B-B14F-4D97-AF65-F5344CB8AC3E}">
-        <p14:creationId xmlns:p14="http://schemas.microsoft.com/office/powerpoint/2010/main" val="1525112947"/>
+        <p14:creationId xmlns:p14="http://schemas.microsoft.com/office/powerpoint/2010/main" val="1612127042"/>
       </p:ext>
     </p:extLst>
   </p:cSld>

</xml_diff>